<commit_message>
[Doc] Add problem statement slide to ppt
</commit_message>
<xml_diff>
--- a/AIAP_19_Technical_Interview.pptx
+++ b/AIAP_19_Technical_Interview.pptx
@@ -6,18 +6,19 @@
   </p:sldMasterIdLst>
   <p:sldIdLst>
     <p:sldId id="256" r:id="rId2"/>
-    <p:sldId id="257" r:id="rId3"/>
-    <p:sldId id="258" r:id="rId4"/>
-    <p:sldId id="260" r:id="rId5"/>
-    <p:sldId id="259" r:id="rId6"/>
-    <p:sldId id="261" r:id="rId7"/>
-    <p:sldId id="262" r:id="rId8"/>
-    <p:sldId id="263" r:id="rId9"/>
-    <p:sldId id="264" r:id="rId10"/>
-    <p:sldId id="266" r:id="rId11"/>
-    <p:sldId id="267" r:id="rId12"/>
-    <p:sldId id="268" r:id="rId13"/>
-    <p:sldId id="269" r:id="rId14"/>
+    <p:sldId id="270" r:id="rId3"/>
+    <p:sldId id="257" r:id="rId4"/>
+    <p:sldId id="258" r:id="rId5"/>
+    <p:sldId id="260" r:id="rId6"/>
+    <p:sldId id="259" r:id="rId7"/>
+    <p:sldId id="261" r:id="rId8"/>
+    <p:sldId id="262" r:id="rId9"/>
+    <p:sldId id="263" r:id="rId10"/>
+    <p:sldId id="264" r:id="rId11"/>
+    <p:sldId id="266" r:id="rId12"/>
+    <p:sldId id="267" r:id="rId13"/>
+    <p:sldId id="268" r:id="rId14"/>
+    <p:sldId id="269" r:id="rId15"/>
   </p:sldIdLst>
   <p:sldSz cx="12192000" cy="6858000"/>
   <p:notesSz cx="6858000" cy="9144000"/>
@@ -122,6 +123,7 @@
         <p14:section name="Default Section" id="{A8474EFC-263A-40E6-AD24-D17C235BED9D}">
           <p14:sldIdLst>
             <p14:sldId id="256"/>
+            <p14:sldId id="270"/>
             <p14:sldId id="257"/>
             <p14:sldId id="258"/>
             <p14:sldId id="260"/>
@@ -137,6 +139,9 @@
           </p14:sldIdLst>
         </p14:section>
       </p14:sectionLst>
+    </p:ext>
+    <p:ext uri="{EFAFB233-063F-42B5-8137-9DF3F51BA10A}">
+      <p15:sldGuideLst xmlns:p15="http://schemas.microsoft.com/office/powerpoint/2012/main"/>
     </p:ext>
   </p:extLst>
 </p:presentation>
@@ -330,7 +335,7 @@
           <a:p>
             <a:fld id="{CF1F6039-9C23-4217-A950-C5ABF2585559}" type="datetimeFigureOut">
               <a:rPr lang="en-SG" smtClean="0"/>
-              <a:t>6/1/2025</a:t>
+              <a:t>17/1/2025</a:t>
             </a:fld>
             <a:endParaRPr lang="en-SG"/>
           </a:p>
@@ -668,7 +673,7 @@
           <a:p>
             <a:fld id="{CF1F6039-9C23-4217-A950-C5ABF2585559}" type="datetimeFigureOut">
               <a:rPr lang="en-SG" smtClean="0"/>
-              <a:t>6/1/2025</a:t>
+              <a:t>17/1/2025</a:t>
             </a:fld>
             <a:endParaRPr lang="en-SG"/>
           </a:p>
@@ -1069,7 +1074,7 @@
           <a:p>
             <a:fld id="{CF1F6039-9C23-4217-A950-C5ABF2585559}" type="datetimeFigureOut">
               <a:rPr lang="en-SG" smtClean="0"/>
-              <a:t>6/1/2025</a:t>
+              <a:t>17/1/2025</a:t>
             </a:fld>
             <a:endParaRPr lang="en-SG"/>
           </a:p>
@@ -1405,7 +1410,7 @@
           <a:p>
             <a:fld id="{CF1F6039-9C23-4217-A950-C5ABF2585559}" type="datetimeFigureOut">
               <a:rPr lang="en-SG" smtClean="0"/>
-              <a:t>6/1/2025</a:t>
+              <a:t>17/1/2025</a:t>
             </a:fld>
             <a:endParaRPr lang="en-SG"/>
           </a:p>
@@ -1725,7 +1730,7 @@
           <a:p>
             <a:fld id="{CF1F6039-9C23-4217-A950-C5ABF2585559}" type="datetimeFigureOut">
               <a:rPr lang="en-SG" smtClean="0"/>
-              <a:t>6/1/2025</a:t>
+              <a:t>17/1/2025</a:t>
             </a:fld>
             <a:endParaRPr lang="en-SG"/>
           </a:p>
@@ -2121,7 +2126,7 @@
           <a:p>
             <a:fld id="{CF1F6039-9C23-4217-A950-C5ABF2585559}" type="datetimeFigureOut">
               <a:rPr lang="en-SG" smtClean="0"/>
-              <a:t>6/1/2025</a:t>
+              <a:t>17/1/2025</a:t>
             </a:fld>
             <a:endParaRPr lang="en-SG"/>
           </a:p>
@@ -2378,7 +2383,7 @@
           <a:p>
             <a:fld id="{CF1F6039-9C23-4217-A950-C5ABF2585559}" type="datetimeFigureOut">
               <a:rPr lang="en-SG" smtClean="0"/>
-              <a:t>6/1/2025</a:t>
+              <a:t>17/1/2025</a:t>
             </a:fld>
             <a:endParaRPr lang="en-SG"/>
           </a:p>
@@ -2640,7 +2645,7 @@
           <a:p>
             <a:fld id="{CF1F6039-9C23-4217-A950-C5ABF2585559}" type="datetimeFigureOut">
               <a:rPr lang="en-SG" smtClean="0"/>
-              <a:t>6/1/2025</a:t>
+              <a:t>17/1/2025</a:t>
             </a:fld>
             <a:endParaRPr lang="en-SG"/>
           </a:p>
@@ -2902,7 +2907,7 @@
           <a:p>
             <a:fld id="{CF1F6039-9C23-4217-A950-C5ABF2585559}" type="datetimeFigureOut">
               <a:rPr lang="en-SG" smtClean="0"/>
-              <a:t>6/1/2025</a:t>
+              <a:t>17/1/2025</a:t>
             </a:fld>
             <a:endParaRPr lang="en-SG"/>
           </a:p>
@@ -3231,7 +3236,7 @@
           <a:p>
             <a:fld id="{CF1F6039-9C23-4217-A950-C5ABF2585559}" type="datetimeFigureOut">
               <a:rPr lang="en-SG" smtClean="0"/>
-              <a:t>6/1/2025</a:t>
+              <a:t>17/1/2025</a:t>
             </a:fld>
             <a:endParaRPr lang="en-SG"/>
           </a:p>
@@ -3554,7 +3559,7 @@
           <a:p>
             <a:fld id="{CF1F6039-9C23-4217-A950-C5ABF2585559}" type="datetimeFigureOut">
               <a:rPr lang="en-SG" smtClean="0"/>
-              <a:t>6/1/2025</a:t>
+              <a:t>17/1/2025</a:t>
             </a:fld>
             <a:endParaRPr lang="en-SG"/>
           </a:p>
@@ -4011,7 +4016,7 @@
           <a:p>
             <a:fld id="{CF1F6039-9C23-4217-A950-C5ABF2585559}" type="datetimeFigureOut">
               <a:rPr lang="en-SG" smtClean="0"/>
-              <a:t>6/1/2025</a:t>
+              <a:t>17/1/2025</a:t>
             </a:fld>
             <a:endParaRPr lang="en-SG"/>
           </a:p>
@@ -4216,7 +4221,7 @@
           <a:p>
             <a:fld id="{CF1F6039-9C23-4217-A950-C5ABF2585559}" type="datetimeFigureOut">
               <a:rPr lang="en-SG" smtClean="0"/>
-              <a:t>6/1/2025</a:t>
+              <a:t>17/1/2025</a:t>
             </a:fld>
             <a:endParaRPr lang="en-SG"/>
           </a:p>
@@ -4393,7 +4398,7 @@
           <a:p>
             <a:fld id="{CF1F6039-9C23-4217-A950-C5ABF2585559}" type="datetimeFigureOut">
               <a:rPr lang="en-SG" smtClean="0"/>
-              <a:t>6/1/2025</a:t>
+              <a:t>17/1/2025</a:t>
             </a:fld>
             <a:endParaRPr lang="en-SG"/>
           </a:p>
@@ -4726,7 +4731,7 @@
           <a:p>
             <a:fld id="{CF1F6039-9C23-4217-A950-C5ABF2585559}" type="datetimeFigureOut">
               <a:rPr lang="en-SG" smtClean="0"/>
-              <a:t>6/1/2025</a:t>
+              <a:t>17/1/2025</a:t>
             </a:fld>
             <a:endParaRPr lang="en-SG"/>
           </a:p>
@@ -5071,7 +5076,7 @@
           <a:p>
             <a:fld id="{CF1F6039-9C23-4217-A950-C5ABF2585559}" type="datetimeFigureOut">
               <a:rPr lang="en-SG" smtClean="0"/>
-              <a:t>6/1/2025</a:t>
+              <a:t>17/1/2025</a:t>
             </a:fld>
             <a:endParaRPr lang="en-SG"/>
           </a:p>
@@ -7188,7 +7193,7 @@
           <a:p>
             <a:fld id="{CF1F6039-9C23-4217-A950-C5ABF2585559}" type="datetimeFigureOut">
               <a:rPr lang="en-SG" smtClean="0"/>
-              <a:t>6/1/2025</a:t>
+              <a:t>17/1/2025</a:t>
             </a:fld>
             <a:endParaRPr lang="en-SG"/>
           </a:p>
@@ -7787,6 +7792,134 @@
         <p:cNvPr id="1" name="">
           <a:extLst>
             <a:ext uri="{FF2B5EF4-FFF2-40B4-BE49-F238E27FC236}">
+              <a16:creationId xmlns:a16="http://schemas.microsoft.com/office/drawing/2014/main" id="{193EFBBC-C003-F6CC-9130-15E7FF2F5A2A}"/>
+            </a:ext>
+          </a:extLst>
+        </p:cNvPr>
+        <p:cNvGrpSpPr/>
+        <p:nvPr/>
+      </p:nvGrpSpPr>
+      <p:grpSpPr>
+        <a:xfrm>
+          <a:off x="0" y="0"/>
+          <a:ext cx="0" cy="0"/>
+          <a:chOff x="0" y="0"/>
+          <a:chExt cx="0" cy="0"/>
+        </a:xfrm>
+      </p:grpSpPr>
+      <p:sp>
+        <p:nvSpPr>
+          <p:cNvPr id="2" name="Title 1">
+            <a:extLst>
+              <a:ext uri="{FF2B5EF4-FFF2-40B4-BE49-F238E27FC236}">
+                <a16:creationId xmlns:a16="http://schemas.microsoft.com/office/drawing/2014/main" id="{FF99D236-62A4-A729-494A-B0611983B9C2}"/>
+              </a:ext>
+            </a:extLst>
+          </p:cNvPr>
+          <p:cNvSpPr>
+            <a:spLocks noGrp="1"/>
+          </p:cNvSpPr>
+          <p:nvPr>
+            <p:ph type="title"/>
+          </p:nvPr>
+        </p:nvSpPr>
+        <p:spPr/>
+        <p:txBody>
+          <a:bodyPr/>
+          <a:lstStyle/>
+          <a:p>
+            <a:r>
+              <a:rPr lang="en-US" dirty="0"/>
+              <a:t>Metric (Classification) (1/2)</a:t>
+            </a:r>
+            <a:endParaRPr lang="en-SG" dirty="0"/>
+          </a:p>
+        </p:txBody>
+      </p:sp>
+      <p:sp>
+        <p:nvSpPr>
+          <p:cNvPr id="3" name="Content Placeholder 2">
+            <a:extLst>
+              <a:ext uri="{FF2B5EF4-FFF2-40B4-BE49-F238E27FC236}">
+                <a16:creationId xmlns:a16="http://schemas.microsoft.com/office/drawing/2014/main" id="{7B54FDC0-1A1D-DB5F-5FC6-1D43F228F686}"/>
+              </a:ext>
+            </a:extLst>
+          </p:cNvPr>
+          <p:cNvSpPr>
+            <a:spLocks noGrp="1"/>
+          </p:cNvSpPr>
+          <p:nvPr>
+            <p:ph idx="1"/>
+          </p:nvPr>
+        </p:nvSpPr>
+        <p:spPr/>
+        <p:txBody>
+          <a:bodyPr/>
+          <a:lstStyle/>
+          <a:p>
+            <a:r>
+              <a:rPr lang="en-US" dirty="0"/>
+              <a:t>Confusion Matrix</a:t>
+            </a:r>
+          </a:p>
+          <a:p>
+            <a:pPr lvl="1"/>
+            <a:r>
+              <a:rPr lang="en-US" dirty="0"/>
+              <a:t>Helps to visualize model performance by showing number of correct/incorrect predictions for each class</a:t>
+            </a:r>
+          </a:p>
+          <a:p>
+            <a:pPr lvl="1"/>
+            <a:r>
+              <a:rPr lang="en-US" dirty="0"/>
+              <a:t>Helps to identify errors (false positive/false negative) and assess how well model is performing</a:t>
+            </a:r>
+          </a:p>
+          <a:p>
+            <a:r>
+              <a:rPr lang="en-US" dirty="0"/>
+              <a:t>Classification Report</a:t>
+            </a:r>
+          </a:p>
+          <a:p>
+            <a:pPr lvl="1"/>
+            <a:r>
+              <a:rPr lang="en-US" dirty="0"/>
+              <a:t>Provides detailed performance evaluation of model by calculating precision, recall, f1-score, and support for each class</a:t>
+            </a:r>
+          </a:p>
+          <a:p>
+            <a:pPr lvl="1"/>
+            <a:r>
+              <a:rPr lang="en-US" dirty="0"/>
+              <a:t>Useful in situations where there are imbalanced classes or need to evaluate model’s behavior for each class</a:t>
+            </a:r>
+            <a:endParaRPr lang="en-SG" dirty="0"/>
+          </a:p>
+        </p:txBody>
+      </p:sp>
+    </p:spTree>
+    <p:extLst>
+      <p:ext uri="{BB962C8B-B14F-4D97-AF65-F5344CB8AC3E}">
+        <p14:creationId xmlns:p14="http://schemas.microsoft.com/office/powerpoint/2010/main" val="62151355"/>
+      </p:ext>
+    </p:extLst>
+  </p:cSld>
+  <p:clrMapOvr>
+    <a:masterClrMapping/>
+  </p:clrMapOvr>
+</p:sld>
+</file>
+
+<file path=ppt/slides/slide11.xml><?xml version="1.0" encoding="utf-8"?>
+<p:sld xmlns:a="http://schemas.openxmlformats.org/drawingml/2006/main" xmlns:r="http://schemas.openxmlformats.org/officeDocument/2006/relationships" xmlns:p="http://schemas.openxmlformats.org/presentationml/2006/main">
+  <p:cSld>
+    <p:spTree>
+      <p:nvGrpSpPr>
+        <p:cNvPr id="1" name="">
+          <a:extLst>
+            <a:ext uri="{FF2B5EF4-FFF2-40B4-BE49-F238E27FC236}">
               <a16:creationId xmlns:a16="http://schemas.microsoft.com/office/drawing/2014/main" id="{4D17F83D-056A-FC58-669D-DCC680DBB35F}"/>
             </a:ext>
           </a:extLst>
@@ -8011,7 +8144,7 @@
 </p:sld>
 </file>
 
-<file path=ppt/slides/slide11.xml><?xml version="1.0" encoding="utf-8"?>
+<file path=ppt/slides/slide12.xml><?xml version="1.0" encoding="utf-8"?>
 <p:sld xmlns:a="http://schemas.openxmlformats.org/drawingml/2006/main" xmlns:r="http://schemas.openxmlformats.org/officeDocument/2006/relationships" xmlns:p="http://schemas.openxmlformats.org/presentationml/2006/main">
   <p:cSld>
     <p:bg>
@@ -10640,7 +10773,7 @@
 </p:sld>
 </file>
 
-<file path=ppt/slides/slide12.xml><?xml version="1.0" encoding="utf-8"?>
+<file path=ppt/slides/slide13.xml><?xml version="1.0" encoding="utf-8"?>
 <p:sld xmlns:a="http://schemas.openxmlformats.org/drawingml/2006/main" xmlns:r="http://schemas.openxmlformats.org/officeDocument/2006/relationships" xmlns:p="http://schemas.openxmlformats.org/presentationml/2006/main">
   <p:cSld>
     <p:spTree>
@@ -10724,7 +10857,7 @@
 </p:sld>
 </file>
 
-<file path=ppt/slides/slide13.xml><?xml version="1.0" encoding="utf-8"?>
+<file path=ppt/slides/slide14.xml><?xml version="1.0" encoding="utf-8"?>
 <p:sld xmlns:a="http://schemas.openxmlformats.org/drawingml/2006/main" xmlns:r="http://schemas.openxmlformats.org/officeDocument/2006/relationships" xmlns:p="http://schemas.openxmlformats.org/presentationml/2006/main">
   <p:cSld>
     <p:spTree>
@@ -10815,6 +10948,118 @@
 </file>
 
 <file path=ppt/slides/slide2.xml><?xml version="1.0" encoding="utf-8"?>
+<p:sld xmlns:a="http://schemas.openxmlformats.org/drawingml/2006/main" xmlns:r="http://schemas.openxmlformats.org/officeDocument/2006/relationships" xmlns:p="http://schemas.openxmlformats.org/presentationml/2006/main">
+  <p:cSld>
+    <p:spTree>
+      <p:nvGrpSpPr>
+        <p:cNvPr id="1" name=""/>
+        <p:cNvGrpSpPr/>
+        <p:nvPr/>
+      </p:nvGrpSpPr>
+      <p:grpSpPr>
+        <a:xfrm>
+          <a:off x="0" y="0"/>
+          <a:ext cx="0" cy="0"/>
+          <a:chOff x="0" y="0"/>
+          <a:chExt cx="0" cy="0"/>
+        </a:xfrm>
+      </p:grpSpPr>
+      <p:sp>
+        <p:nvSpPr>
+          <p:cNvPr id="2" name="Title 1">
+            <a:extLst>
+              <a:ext uri="{FF2B5EF4-FFF2-40B4-BE49-F238E27FC236}">
+                <a16:creationId xmlns:a16="http://schemas.microsoft.com/office/drawing/2014/main" id="{70ABE3E5-E7F8-4747-5496-83E639B7F052}"/>
+              </a:ext>
+            </a:extLst>
+          </p:cNvPr>
+          <p:cNvSpPr>
+            <a:spLocks noGrp="1"/>
+          </p:cNvSpPr>
+          <p:nvPr>
+            <p:ph type="title"/>
+          </p:nvPr>
+        </p:nvSpPr>
+        <p:spPr/>
+        <p:txBody>
+          <a:bodyPr/>
+          <a:lstStyle/>
+          <a:p>
+            <a:r>
+              <a:rPr lang="en-US" dirty="0"/>
+              <a:t>Problem Statement</a:t>
+            </a:r>
+            <a:endParaRPr lang="en-SG" dirty="0"/>
+          </a:p>
+        </p:txBody>
+      </p:sp>
+      <p:sp>
+        <p:nvSpPr>
+          <p:cNvPr id="3" name="Content Placeholder 2">
+            <a:extLst>
+              <a:ext uri="{FF2B5EF4-FFF2-40B4-BE49-F238E27FC236}">
+                <a16:creationId xmlns:a16="http://schemas.microsoft.com/office/drawing/2014/main" id="{8596DEA7-D630-DF31-BFBE-0F0174EA058A}"/>
+              </a:ext>
+            </a:extLst>
+          </p:cNvPr>
+          <p:cNvSpPr>
+            <a:spLocks noGrp="1"/>
+          </p:cNvSpPr>
+          <p:nvPr>
+            <p:ph idx="1"/>
+          </p:nvPr>
+        </p:nvSpPr>
+        <p:spPr/>
+        <p:txBody>
+          <a:bodyPr/>
+          <a:lstStyle/>
+          <a:p>
+            <a:r>
+              <a:rPr lang="en-US" dirty="0" err="1"/>
+              <a:t>AgroTech</a:t>
+            </a:r>
+            <a:r>
+              <a:rPr lang="en-US" dirty="0"/>
+              <a:t> innovations faces challenges in optimizing crop yields and resource management due to inefficiencies</a:t>
+            </a:r>
+          </a:p>
+          <a:p>
+            <a:r>
+              <a:rPr lang="en-US" dirty="0"/>
+              <a:t>Goal:</a:t>
+            </a:r>
+          </a:p>
+          <a:p>
+            <a:pPr lvl="1"/>
+            <a:r>
+              <a:rPr lang="en-US" dirty="0"/>
+              <a:t>Predict temperature conditions within farms’ closed environment to ensure optimal plant growth</a:t>
+            </a:r>
+          </a:p>
+          <a:p>
+            <a:pPr lvl="1"/>
+            <a:r>
+              <a:rPr lang="en-US" dirty="0"/>
+              <a:t>Categorize combined “Plant Type-Stage” based on sensor data to aid in strategic planning and resource allocation</a:t>
+            </a:r>
+            <a:endParaRPr lang="en-SG" dirty="0"/>
+          </a:p>
+        </p:txBody>
+      </p:sp>
+    </p:spTree>
+    <p:extLst>
+      <p:ext uri="{BB962C8B-B14F-4D97-AF65-F5344CB8AC3E}">
+        <p14:creationId xmlns:p14="http://schemas.microsoft.com/office/powerpoint/2010/main" val="3342816322"/>
+      </p:ext>
+    </p:extLst>
+  </p:cSld>
+  <p:clrMapOvr>
+    <a:masterClrMapping/>
+  </p:clrMapOvr>
+</p:sld>
+</file>
+
+<file path=ppt/slides/slide3.xml><?xml version="1.0" encoding="utf-8"?>
 <p:sld xmlns:a="http://schemas.openxmlformats.org/drawingml/2006/main" xmlns:r="http://schemas.openxmlformats.org/officeDocument/2006/relationships" xmlns:p="http://schemas.openxmlformats.org/presentationml/2006/main">
   <p:cSld>
     <p:bg>
@@ -11306,7 +11551,7 @@
 </p:sld>
 </file>
 
-<file path=ppt/slides/slide3.xml><?xml version="1.0" encoding="utf-8"?>
+<file path=ppt/slides/slide4.xml><?xml version="1.0" encoding="utf-8"?>
 <p:sld xmlns:a="http://schemas.openxmlformats.org/drawingml/2006/main" xmlns:r="http://schemas.openxmlformats.org/officeDocument/2006/relationships" xmlns:p="http://schemas.openxmlformats.org/presentationml/2006/main">
   <p:cSld>
     <p:spTree>
@@ -11421,7 +11666,7 @@
           <a:p>
             <a:r>
               <a:rPr lang="en-SG" dirty="0"/>
-              <a:t>Part-specific</a:t>
+              <a:t>Task-specific (Label-encoded)</a:t>
             </a:r>
           </a:p>
           <a:p>
@@ -11441,7 +11686,7 @@
           <a:p>
             <a:r>
               <a:rPr lang="en-SG" dirty="0"/>
-              <a:t>Remaining columns with ‘object’ type data are one-hot encoded</a:t>
+              <a:t>Columns with ‘object’ type data are one-hot encoded</a:t>
             </a:r>
           </a:p>
           <a:p>
@@ -11465,7 +11710,7 @@
 </p:sld>
 </file>
 
-<file path=ppt/slides/slide4.xml><?xml version="1.0" encoding="utf-8"?>
+<file path=ppt/slides/slide5.xml><?xml version="1.0" encoding="utf-8"?>
 <p:sld xmlns:a="http://schemas.openxmlformats.org/drawingml/2006/main" xmlns:r="http://schemas.openxmlformats.org/officeDocument/2006/relationships" xmlns:p="http://schemas.openxmlformats.org/presentationml/2006/main">
   <p:cSld>
     <p:bg>
@@ -11963,7 +12208,7 @@
 </p:sld>
 </file>
 
-<file path=ppt/slides/slide5.xml><?xml version="1.0" encoding="utf-8"?>
+<file path=ppt/slides/slide6.xml><?xml version="1.0" encoding="utf-8"?>
 <p:sld xmlns:a="http://schemas.openxmlformats.org/drawingml/2006/main" xmlns:r="http://schemas.openxmlformats.org/officeDocument/2006/relationships" xmlns:p="http://schemas.openxmlformats.org/presentationml/2006/main">
   <p:cSld>
     <p:bg>
@@ -12461,7 +12706,7 @@
 </p:sld>
 </file>
 
-<file path=ppt/slides/slide6.xml><?xml version="1.0" encoding="utf-8"?>
+<file path=ppt/slides/slide7.xml><?xml version="1.0" encoding="utf-8"?>
 <p:sld xmlns:a="http://schemas.openxmlformats.org/drawingml/2006/main" xmlns:r="http://schemas.openxmlformats.org/officeDocument/2006/relationships" xmlns:p="http://schemas.openxmlformats.org/presentationml/2006/main">
   <p:cSld>
     <p:spTree>
@@ -12636,7 +12881,7 @@
 </p:sld>
 </file>
 
-<file path=ppt/slides/slide7.xml><?xml version="1.0" encoding="utf-8"?>
+<file path=ppt/slides/slide8.xml><?xml version="1.0" encoding="utf-8"?>
 <p:sld xmlns:a="http://schemas.openxmlformats.org/drawingml/2006/main" xmlns:r="http://schemas.openxmlformats.org/officeDocument/2006/relationships" xmlns:p="http://schemas.openxmlformats.org/presentationml/2006/main">
   <p:cSld>
     <p:spTree>
@@ -12800,7 +13045,7 @@
 </p:sld>
 </file>
 
-<file path=ppt/slides/slide8.xml><?xml version="1.0" encoding="utf-8"?>
+<file path=ppt/slides/slide9.xml><?xml version="1.0" encoding="utf-8"?>
 <p:sld xmlns:a="http://schemas.openxmlformats.org/drawingml/2006/main" xmlns:r="http://schemas.openxmlformats.org/officeDocument/2006/relationships" xmlns:p="http://schemas.openxmlformats.org/presentationml/2006/main">
   <p:cSld>
     <p:spTree>
@@ -13058,134 +13303,6 @@
     <p:extLst>
       <p:ext uri="{BB962C8B-B14F-4D97-AF65-F5344CB8AC3E}">
         <p14:creationId xmlns:p14="http://schemas.microsoft.com/office/powerpoint/2010/main" val="339281688"/>
-      </p:ext>
-    </p:extLst>
-  </p:cSld>
-  <p:clrMapOvr>
-    <a:masterClrMapping/>
-  </p:clrMapOvr>
-</p:sld>
-</file>
-
-<file path=ppt/slides/slide9.xml><?xml version="1.0" encoding="utf-8"?>
-<p:sld xmlns:a="http://schemas.openxmlformats.org/drawingml/2006/main" xmlns:r="http://schemas.openxmlformats.org/officeDocument/2006/relationships" xmlns:p="http://schemas.openxmlformats.org/presentationml/2006/main">
-  <p:cSld>
-    <p:spTree>
-      <p:nvGrpSpPr>
-        <p:cNvPr id="1" name="">
-          <a:extLst>
-            <a:ext uri="{FF2B5EF4-FFF2-40B4-BE49-F238E27FC236}">
-              <a16:creationId xmlns:a16="http://schemas.microsoft.com/office/drawing/2014/main" id="{193EFBBC-C003-F6CC-9130-15E7FF2F5A2A}"/>
-            </a:ext>
-          </a:extLst>
-        </p:cNvPr>
-        <p:cNvGrpSpPr/>
-        <p:nvPr/>
-      </p:nvGrpSpPr>
-      <p:grpSpPr>
-        <a:xfrm>
-          <a:off x="0" y="0"/>
-          <a:ext cx="0" cy="0"/>
-          <a:chOff x="0" y="0"/>
-          <a:chExt cx="0" cy="0"/>
-        </a:xfrm>
-      </p:grpSpPr>
-      <p:sp>
-        <p:nvSpPr>
-          <p:cNvPr id="2" name="Title 1">
-            <a:extLst>
-              <a:ext uri="{FF2B5EF4-FFF2-40B4-BE49-F238E27FC236}">
-                <a16:creationId xmlns:a16="http://schemas.microsoft.com/office/drawing/2014/main" id="{FF99D236-62A4-A729-494A-B0611983B9C2}"/>
-              </a:ext>
-            </a:extLst>
-          </p:cNvPr>
-          <p:cNvSpPr>
-            <a:spLocks noGrp="1"/>
-          </p:cNvSpPr>
-          <p:nvPr>
-            <p:ph type="title"/>
-          </p:nvPr>
-        </p:nvSpPr>
-        <p:spPr/>
-        <p:txBody>
-          <a:bodyPr/>
-          <a:lstStyle/>
-          <a:p>
-            <a:r>
-              <a:rPr lang="en-US" dirty="0"/>
-              <a:t>Metric (Classification) (1/2)</a:t>
-            </a:r>
-            <a:endParaRPr lang="en-SG" dirty="0"/>
-          </a:p>
-        </p:txBody>
-      </p:sp>
-      <p:sp>
-        <p:nvSpPr>
-          <p:cNvPr id="3" name="Content Placeholder 2">
-            <a:extLst>
-              <a:ext uri="{FF2B5EF4-FFF2-40B4-BE49-F238E27FC236}">
-                <a16:creationId xmlns:a16="http://schemas.microsoft.com/office/drawing/2014/main" id="{7B54FDC0-1A1D-DB5F-5FC6-1D43F228F686}"/>
-              </a:ext>
-            </a:extLst>
-          </p:cNvPr>
-          <p:cNvSpPr>
-            <a:spLocks noGrp="1"/>
-          </p:cNvSpPr>
-          <p:nvPr>
-            <p:ph idx="1"/>
-          </p:nvPr>
-        </p:nvSpPr>
-        <p:spPr/>
-        <p:txBody>
-          <a:bodyPr/>
-          <a:lstStyle/>
-          <a:p>
-            <a:r>
-              <a:rPr lang="en-US" dirty="0"/>
-              <a:t>Confusion Matrix</a:t>
-            </a:r>
-          </a:p>
-          <a:p>
-            <a:pPr lvl="1"/>
-            <a:r>
-              <a:rPr lang="en-US" dirty="0"/>
-              <a:t>Helps to visualize model performance by showing number of correct/incorrect predictions for each class</a:t>
-            </a:r>
-          </a:p>
-          <a:p>
-            <a:pPr lvl="1"/>
-            <a:r>
-              <a:rPr lang="en-US" dirty="0"/>
-              <a:t>Helps to identify errors (false positive/false negative) and assess how well model is performing</a:t>
-            </a:r>
-          </a:p>
-          <a:p>
-            <a:r>
-              <a:rPr lang="en-US" dirty="0"/>
-              <a:t>Classification Report</a:t>
-            </a:r>
-          </a:p>
-          <a:p>
-            <a:pPr lvl="1"/>
-            <a:r>
-              <a:rPr lang="en-US" dirty="0"/>
-              <a:t>Provides detailed performance evaluation of model by calculating precision, recall, f1-score, and support for each class</a:t>
-            </a:r>
-          </a:p>
-          <a:p>
-            <a:pPr lvl="1"/>
-            <a:r>
-              <a:rPr lang="en-US" dirty="0"/>
-              <a:t>Useful in situations where there are imbalanced classes or need to evaluate model’s behavior for each class</a:t>
-            </a:r>
-            <a:endParaRPr lang="en-SG" dirty="0"/>
-          </a:p>
-        </p:txBody>
-      </p:sp>
-    </p:spTree>
-    <p:extLst>
-      <p:ext uri="{BB962C8B-B14F-4D97-AF65-F5344CB8AC3E}">
-        <p14:creationId xmlns:p14="http://schemas.microsoft.com/office/powerpoint/2010/main" val="62151355"/>
       </p:ext>
     </p:extLst>
   </p:cSld>

</xml_diff>